<commit_message>
slides for recitation #2, added a slide
</commit_message>
<xml_diff>
--- a/cs1501_rec2_Sept13.pptx
+++ b/cs1501_rec2_Sept13.pptx
@@ -5,16 +5,17 @@
     <p:sldMasterId id="2147483660" r:id="rId1"/>
   </p:sldMasterIdLst>
   <p:notesMasterIdLst>
-    <p:notesMasterId r:id="rId9"/>
+    <p:notesMasterId r:id="rId10"/>
   </p:notesMasterIdLst>
   <p:sldIdLst>
     <p:sldId id="258" r:id="rId2"/>
     <p:sldId id="259" r:id="rId3"/>
     <p:sldId id="260" r:id="rId4"/>
     <p:sldId id="261" r:id="rId5"/>
-    <p:sldId id="262" r:id="rId6"/>
-    <p:sldId id="263" r:id="rId7"/>
-    <p:sldId id="264" r:id="rId8"/>
+    <p:sldId id="265" r:id="rId6"/>
+    <p:sldId id="262" r:id="rId7"/>
+    <p:sldId id="263" r:id="rId8"/>
+    <p:sldId id="264" r:id="rId9"/>
   </p:sldIdLst>
   <p:sldSz cx="9144000" cy="6858000" type="screen4x3"/>
   <p:notesSz cx="6858000" cy="9144000"/>
@@ -226,7 +227,7 @@
           <a:p>
             <a:fld id="{79DACF82-7282-4538-9925-81D795D18BF0}" type="datetimeFigureOut">
               <a:rPr lang="en-US" smtClean="0"/>
-              <a:t>9/12/2019</a:t>
+              <a:t>9/13/2019</a:t>
             </a:fld>
             <a:endParaRPr lang="en-US"/>
           </a:p>
@@ -642,7 +643,91 @@
           <a:p>
             <a:fld id="{EFAF9F6D-6F5B-4492-B20A-F0EFDC100956}" type="slidenum">
               <a:rPr lang="en-US" smtClean="0"/>
-              <a:t>6</a:t>
+              <a:t>5</a:t>
+            </a:fld>
+            <a:endParaRPr lang="en-US"/>
+          </a:p>
+        </p:txBody>
+      </p:sp>
+    </p:spTree>
+    <p:extLst>
+      <p:ext uri="{BB962C8B-B14F-4D97-AF65-F5344CB8AC3E}">
+        <p14:creationId xmlns:p14="http://schemas.microsoft.com/office/powerpoint/2010/main" val="2881226837"/>
+      </p:ext>
+    </p:extLst>
+  </p:cSld>
+  <p:clrMapOvr>
+    <a:masterClrMapping/>
+  </p:clrMapOvr>
+</p:notes>
+</file>
+
+<file path=ppt/notesSlides/notesSlide3.xml><?xml version="1.0" encoding="utf-8"?>
+<p:notes xmlns:a="http://schemas.openxmlformats.org/drawingml/2006/main" xmlns:r="http://schemas.openxmlformats.org/officeDocument/2006/relationships" xmlns:p="http://schemas.openxmlformats.org/presentationml/2006/main">
+  <p:cSld>
+    <p:spTree>
+      <p:nvGrpSpPr>
+        <p:cNvPr id="1" name=""/>
+        <p:cNvGrpSpPr/>
+        <p:nvPr/>
+      </p:nvGrpSpPr>
+      <p:grpSpPr>
+        <a:xfrm>
+          <a:off x="0" y="0"/>
+          <a:ext cx="0" cy="0"/>
+          <a:chOff x="0" y="0"/>
+          <a:chExt cx="0" cy="0"/>
+        </a:xfrm>
+      </p:grpSpPr>
+      <p:sp>
+        <p:nvSpPr>
+          <p:cNvPr id="2" name="Slide Image Placeholder 1"/>
+          <p:cNvSpPr>
+            <a:spLocks noGrp="1" noRot="1" noChangeAspect="1"/>
+          </p:cNvSpPr>
+          <p:nvPr>
+            <p:ph type="sldImg"/>
+          </p:nvPr>
+        </p:nvSpPr>
+        <p:spPr/>
+      </p:sp>
+      <p:sp>
+        <p:nvSpPr>
+          <p:cNvPr id="3" name="Notes Placeholder 2"/>
+          <p:cNvSpPr>
+            <a:spLocks noGrp="1"/>
+          </p:cNvSpPr>
+          <p:nvPr>
+            <p:ph type="body" idx="1"/>
+          </p:nvPr>
+        </p:nvSpPr>
+        <p:spPr/>
+        <p:txBody>
+          <a:bodyPr/>
+          <a:lstStyle/>
+          <a:p>
+            <a:endParaRPr lang="en-US" dirty="0"/>
+          </a:p>
+        </p:txBody>
+      </p:sp>
+      <p:sp>
+        <p:nvSpPr>
+          <p:cNvPr id="4" name="Slide Number Placeholder 3"/>
+          <p:cNvSpPr>
+            <a:spLocks noGrp="1"/>
+          </p:cNvSpPr>
+          <p:nvPr>
+            <p:ph type="sldNum" sz="quarter" idx="5"/>
+          </p:nvPr>
+        </p:nvSpPr>
+        <p:spPr/>
+        <p:txBody>
+          <a:bodyPr/>
+          <a:lstStyle/>
+          <a:p>
+            <a:fld id="{EFAF9F6D-6F5B-4492-B20A-F0EFDC100956}" type="slidenum">
+              <a:rPr lang="en-US" smtClean="0"/>
+              <a:t>7</a:t>
             </a:fld>
             <a:endParaRPr lang="en-US"/>
           </a:p>
@@ -792,7 +877,7 @@
           <a:p>
             <a:fld id="{7880F47B-3C72-48E5-9CD2-8B9AE0E9AFF7}" type="datetimeFigureOut">
               <a:rPr lang="en-US" smtClean="0"/>
-              <a:t>9/12/2019</a:t>
+              <a:t>9/13/2019</a:t>
             </a:fld>
             <a:endParaRPr lang="en-US"/>
           </a:p>
@@ -962,7 +1047,7 @@
           <a:p>
             <a:fld id="{7880F47B-3C72-48E5-9CD2-8B9AE0E9AFF7}" type="datetimeFigureOut">
               <a:rPr lang="en-US" smtClean="0"/>
-              <a:t>9/12/2019</a:t>
+              <a:t>9/13/2019</a:t>
             </a:fld>
             <a:endParaRPr lang="en-US"/>
           </a:p>
@@ -1142,7 +1227,7 @@
           <a:p>
             <a:fld id="{7880F47B-3C72-48E5-9CD2-8B9AE0E9AFF7}" type="datetimeFigureOut">
               <a:rPr lang="en-US" smtClean="0"/>
-              <a:t>9/12/2019</a:t>
+              <a:t>9/13/2019</a:t>
             </a:fld>
             <a:endParaRPr lang="en-US"/>
           </a:p>
@@ -1312,7 +1397,7 @@
           <a:p>
             <a:fld id="{7880F47B-3C72-48E5-9CD2-8B9AE0E9AFF7}" type="datetimeFigureOut">
               <a:rPr lang="en-US" smtClean="0"/>
-              <a:t>9/12/2019</a:t>
+              <a:t>9/13/2019</a:t>
             </a:fld>
             <a:endParaRPr lang="en-US"/>
           </a:p>
@@ -1556,7 +1641,7 @@
           <a:p>
             <a:fld id="{7880F47B-3C72-48E5-9CD2-8B9AE0E9AFF7}" type="datetimeFigureOut">
               <a:rPr lang="en-US" smtClean="0"/>
-              <a:t>9/12/2019</a:t>
+              <a:t>9/13/2019</a:t>
             </a:fld>
             <a:endParaRPr lang="en-US"/>
           </a:p>
@@ -1788,7 +1873,7 @@
           <a:p>
             <a:fld id="{7880F47B-3C72-48E5-9CD2-8B9AE0E9AFF7}" type="datetimeFigureOut">
               <a:rPr lang="en-US" smtClean="0"/>
-              <a:t>9/12/2019</a:t>
+              <a:t>9/13/2019</a:t>
             </a:fld>
             <a:endParaRPr lang="en-US"/>
           </a:p>
@@ -2155,7 +2240,7 @@
           <a:p>
             <a:fld id="{7880F47B-3C72-48E5-9CD2-8B9AE0E9AFF7}" type="datetimeFigureOut">
               <a:rPr lang="en-US" smtClean="0"/>
-              <a:t>9/12/2019</a:t>
+              <a:t>9/13/2019</a:t>
             </a:fld>
             <a:endParaRPr lang="en-US"/>
           </a:p>
@@ -2273,7 +2358,7 @@
           <a:p>
             <a:fld id="{7880F47B-3C72-48E5-9CD2-8B9AE0E9AFF7}" type="datetimeFigureOut">
               <a:rPr lang="en-US" smtClean="0"/>
-              <a:t>9/12/2019</a:t>
+              <a:t>9/13/2019</a:t>
             </a:fld>
             <a:endParaRPr lang="en-US"/>
           </a:p>
@@ -2368,7 +2453,7 @@
           <a:p>
             <a:fld id="{7880F47B-3C72-48E5-9CD2-8B9AE0E9AFF7}" type="datetimeFigureOut">
               <a:rPr lang="en-US" smtClean="0"/>
-              <a:t>9/12/2019</a:t>
+              <a:t>9/13/2019</a:t>
             </a:fld>
             <a:endParaRPr lang="en-US"/>
           </a:p>
@@ -2645,7 +2730,7 @@
           <a:p>
             <a:fld id="{7880F47B-3C72-48E5-9CD2-8B9AE0E9AFF7}" type="datetimeFigureOut">
               <a:rPr lang="en-US" smtClean="0"/>
-              <a:t>9/12/2019</a:t>
+              <a:t>9/13/2019</a:t>
             </a:fld>
             <a:endParaRPr lang="en-US"/>
           </a:p>
@@ -2902,7 +2987,7 @@
           <a:p>
             <a:fld id="{7880F47B-3C72-48E5-9CD2-8B9AE0E9AFF7}" type="datetimeFigureOut">
               <a:rPr lang="en-US" smtClean="0"/>
-              <a:t>9/12/2019</a:t>
+              <a:t>9/13/2019</a:t>
             </a:fld>
             <a:endParaRPr lang="en-US"/>
           </a:p>
@@ -3115,7 +3200,7 @@
           <a:p>
             <a:fld id="{7880F47B-3C72-48E5-9CD2-8B9AE0E9AFF7}" type="datetimeFigureOut">
               <a:rPr lang="en-US" smtClean="0"/>
-              <a:t>9/12/2019</a:t>
+              <a:t>9/13/2019</a:t>
             </a:fld>
             <a:endParaRPr lang="en-US"/>
           </a:p>
@@ -3657,6 +3742,13 @@
   <p:clrMapOvr>
     <a:masterClrMapping/>
   </p:clrMapOvr>
+  <p:timing>
+    <p:tnLst>
+      <p:par>
+        <p:cTn id="1" dur="indefinite" restart="never" nodeType="tmRoot"/>
+      </p:par>
+    </p:tnLst>
+  </p:timing>
 </p:sld>
 </file>
 
@@ -5763,6 +5855,294 @@
           <a:lstStyle/>
           <a:p>
             <a:r>
+              <a:rPr lang="en-US" sz="2800" dirty="0" smtClean="0">
+                <a:solidFill>
+                  <a:srgbClr val="002060"/>
+                </a:solidFill>
+              </a:rPr>
+              <a:t>More efficient approach the textbook code uses:</a:t>
+            </a:r>
+            <a:endParaRPr lang="en-US" sz="2800" dirty="0">
+              <a:solidFill>
+                <a:srgbClr val="002060"/>
+              </a:solidFill>
+            </a:endParaRPr>
+          </a:p>
+        </p:txBody>
+      </p:sp>
+      <p:sp>
+        <p:nvSpPr>
+          <p:cNvPr id="18" name="TextBox 17"/>
+          <p:cNvSpPr txBox="1"/>
+          <p:nvPr/>
+        </p:nvSpPr>
+        <p:spPr>
+          <a:xfrm>
+            <a:off x="362915" y="1734845"/>
+            <a:ext cx="5383544" cy="769441"/>
+          </a:xfrm>
+          <a:prstGeom prst="rect">
+            <a:avLst/>
+          </a:prstGeom>
+        </p:spPr>
+        <p:txBody>
+          <a:bodyPr wrap="square" rtlCol="0">
+            <a:spAutoFit/>
+          </a:bodyPr>
+          <a:lstStyle/>
+          <a:p>
+            <a:r>
+              <a:rPr lang="en-US" sz="2200" dirty="0"/>
+              <a:t>Loop through </a:t>
+            </a:r>
+            <a:r>
+              <a:rPr lang="en-US" sz="2200" dirty="0" smtClean="0"/>
+              <a:t>the input array:</a:t>
+            </a:r>
+          </a:p>
+          <a:p>
+            <a:r>
+              <a:rPr lang="en-US" sz="2200" i="1" dirty="0" smtClean="0"/>
+              <a:t>for(</a:t>
+            </a:r>
+            <a:r>
+              <a:rPr lang="en-US" sz="2200" i="1" dirty="0" err="1" smtClean="0"/>
+              <a:t>int</a:t>
+            </a:r>
+            <a:r>
+              <a:rPr lang="en-US" sz="2200" i="1" dirty="0" smtClean="0"/>
+              <a:t> </a:t>
+            </a:r>
+            <a:r>
+              <a:rPr lang="en-US" sz="2200" i="1" dirty="0"/>
+              <a:t>i</a:t>
+            </a:r>
+            <a:r>
+              <a:rPr lang="en-US" sz="2200" i="1" dirty="0" smtClean="0"/>
+              <a:t> </a:t>
+            </a:r>
+            <a:r>
+              <a:rPr lang="en-US" sz="2200" i="1" dirty="0"/>
+              <a:t>= 0; </a:t>
+            </a:r>
+            <a:r>
+              <a:rPr lang="en-US" sz="2200" i="1" dirty="0"/>
+              <a:t>i</a:t>
+            </a:r>
+            <a:r>
+              <a:rPr lang="en-US" sz="2200" i="1" dirty="0" smtClean="0"/>
+              <a:t> </a:t>
+            </a:r>
+            <a:r>
+              <a:rPr lang="en-US" sz="2200" i="1" dirty="0"/>
+              <a:t>&lt; </a:t>
+            </a:r>
+            <a:r>
+              <a:rPr lang="en-US" sz="2200" i="1" dirty="0" err="1" smtClean="0"/>
+              <a:t>a.length</a:t>
+            </a:r>
+            <a:r>
+              <a:rPr lang="en-US" sz="2200" i="1" dirty="0" smtClean="0"/>
+              <a:t>; </a:t>
+            </a:r>
+            <a:r>
+              <a:rPr lang="en-US" sz="2200" i="1" dirty="0"/>
+              <a:t>i</a:t>
+            </a:r>
+            <a:r>
+              <a:rPr lang="en-US" sz="2200" i="1" dirty="0" smtClean="0"/>
+              <a:t>++)</a:t>
+            </a:r>
+            <a:r>
+              <a:rPr lang="en-US" sz="2200" dirty="0" smtClean="0"/>
+              <a:t> </a:t>
+            </a:r>
+            <a:endParaRPr lang="en-US" sz="2200" dirty="0"/>
+          </a:p>
+        </p:txBody>
+      </p:sp>
+      <p:sp>
+        <p:nvSpPr>
+          <p:cNvPr id="13" name="TextBox 12"/>
+          <p:cNvSpPr txBox="1"/>
+          <p:nvPr/>
+        </p:nvSpPr>
+        <p:spPr>
+          <a:xfrm>
+            <a:off x="341972" y="714493"/>
+            <a:ext cx="4363845" cy="430887"/>
+          </a:xfrm>
+          <a:prstGeom prst="rect">
+            <a:avLst/>
+          </a:prstGeom>
+        </p:spPr>
+        <p:txBody>
+          <a:bodyPr wrap="square" rtlCol="0">
+            <a:spAutoFit/>
+          </a:bodyPr>
+          <a:lstStyle/>
+          <a:p>
+            <a:r>
+              <a:rPr lang="en-US" sz="2200" dirty="0"/>
+              <a:t>For each digit column:</a:t>
+            </a:r>
+          </a:p>
+        </p:txBody>
+      </p:sp>
+      <p:sp>
+        <p:nvSpPr>
+          <p:cNvPr id="15" name="TextBox 14"/>
+          <p:cNvSpPr txBox="1"/>
+          <p:nvPr/>
+        </p:nvSpPr>
+        <p:spPr>
+          <a:xfrm>
+            <a:off x="341971" y="1213102"/>
+            <a:ext cx="4363845" cy="430887"/>
+          </a:xfrm>
+          <a:prstGeom prst="rect">
+            <a:avLst/>
+          </a:prstGeom>
+        </p:spPr>
+        <p:txBody>
+          <a:bodyPr wrap="square" rtlCol="0">
+            <a:spAutoFit/>
+          </a:bodyPr>
+          <a:lstStyle/>
+          <a:p>
+            <a:r>
+              <a:rPr lang="en-US" sz="2200" dirty="0"/>
+              <a:t>Create a new blank array. </a:t>
+            </a:r>
+          </a:p>
+        </p:txBody>
+      </p:sp>
+      <p:sp>
+        <p:nvSpPr>
+          <p:cNvPr id="17" name="TextBox 16"/>
+          <p:cNvSpPr txBox="1"/>
+          <p:nvPr/>
+        </p:nvSpPr>
+        <p:spPr>
+          <a:xfrm>
+            <a:off x="362915" y="2542055"/>
+            <a:ext cx="4786313" cy="4493538"/>
+          </a:xfrm>
+          <a:prstGeom prst="rect">
+            <a:avLst/>
+          </a:prstGeom>
+          <a:noFill/>
+        </p:spPr>
+        <p:txBody>
+          <a:bodyPr wrap="square" rtlCol="0">
+            <a:spAutoFit/>
+          </a:bodyPr>
+          <a:lstStyle/>
+          <a:p>
+            <a:pPr marL="342900" indent="-342900">
+              <a:buFont typeface="Arial" panose="020B0604020202020204" pitchFamily="34" charset="0"/>
+              <a:buChar char="•"/>
+            </a:pPr>
+            <a:r>
+              <a:rPr lang="en-US" sz="2200" dirty="0" smtClean="0"/>
+              <a:t>In this loop, update frequency counts for digits encountered</a:t>
+            </a:r>
+          </a:p>
+          <a:p>
+            <a:pPr marL="342900" indent="-342900">
+              <a:buFont typeface="Arial" panose="020B0604020202020204" pitchFamily="34" charset="0"/>
+              <a:buChar char="•"/>
+            </a:pPr>
+            <a:r>
+              <a:rPr lang="en-US" sz="2200" dirty="0" smtClean="0"/>
+              <a:t>Use this information to find the range of rows into which items with each digit should be copied</a:t>
+            </a:r>
+          </a:p>
+          <a:p>
+            <a:pPr marL="342900" indent="-342900">
+              <a:buFont typeface="Arial" panose="020B0604020202020204" pitchFamily="34" charset="0"/>
+              <a:buChar char="•"/>
+            </a:pPr>
+            <a:r>
+              <a:rPr lang="en-US" sz="2200" dirty="0" smtClean="0"/>
+              <a:t>For example, if we have 5 “1’s” and 5 “2’s”, then we know that 1’s should be placed in rows 0-4, and 2’s in rows 5-9.</a:t>
+            </a:r>
+          </a:p>
+          <a:p>
+            <a:pPr marL="342900" indent="-342900">
+              <a:buFont typeface="Arial" panose="020B0604020202020204" pitchFamily="34" charset="0"/>
+              <a:buChar char="•"/>
+            </a:pPr>
+            <a:r>
+              <a:rPr lang="en-US" sz="2200" dirty="0" smtClean="0"/>
+              <a:t>Once we’ve computed these range markers, we just need to do one more loop to increment the copy.</a:t>
+            </a:r>
+            <a:endParaRPr lang="en-US" sz="2200" dirty="0" smtClean="0"/>
+          </a:p>
+          <a:p>
+            <a:endParaRPr lang="en-US" sz="2200" dirty="0" smtClean="0"/>
+          </a:p>
+        </p:txBody>
+      </p:sp>
+    </p:spTree>
+    <p:extLst>
+      <p:ext uri="{BB962C8B-B14F-4D97-AF65-F5344CB8AC3E}">
+        <p14:creationId xmlns:p14="http://schemas.microsoft.com/office/powerpoint/2010/main" val="3499698478"/>
+      </p:ext>
+    </p:extLst>
+  </p:cSld>
+  <p:clrMapOvr>
+    <a:masterClrMapping/>
+  </p:clrMapOvr>
+  <p:timing>
+    <p:tnLst>
+      <p:par>
+        <p:cTn id="1" dur="indefinite" restart="never" nodeType="tmRoot"/>
+      </p:par>
+    </p:tnLst>
+  </p:timing>
+</p:sld>
+</file>
+
+<file path=ppt/slides/slide6.xml><?xml version="1.0" encoding="utf-8"?>
+<p:sld xmlns:a="http://schemas.openxmlformats.org/drawingml/2006/main" xmlns:r="http://schemas.openxmlformats.org/officeDocument/2006/relationships" xmlns:p="http://schemas.openxmlformats.org/presentationml/2006/main">
+  <p:cSld>
+    <p:spTree>
+      <p:nvGrpSpPr>
+        <p:cNvPr id="1" name=""/>
+        <p:cNvGrpSpPr/>
+        <p:nvPr/>
+      </p:nvGrpSpPr>
+      <p:grpSpPr>
+        <a:xfrm>
+          <a:off x="0" y="0"/>
+          <a:ext cx="0" cy="0"/>
+          <a:chOff x="0" y="0"/>
+          <a:chExt cx="0" cy="0"/>
+        </a:xfrm>
+      </p:grpSpPr>
+      <p:sp>
+        <p:nvSpPr>
+          <p:cNvPr id="8" name="TextBox 7"/>
+          <p:cNvSpPr txBox="1"/>
+          <p:nvPr/>
+        </p:nvSpPr>
+        <p:spPr>
+          <a:xfrm>
+            <a:off x="89209" y="0"/>
+            <a:ext cx="8134066" cy="523220"/>
+          </a:xfrm>
+          <a:prstGeom prst="rect">
+            <a:avLst/>
+          </a:prstGeom>
+        </p:spPr>
+        <p:txBody>
+          <a:bodyPr rtlCol="0">
+            <a:spAutoFit/>
+          </a:bodyPr>
+          <a:lstStyle/>
+          <a:p>
+            <a:r>
               <a:rPr lang="en-US" sz="2800" u="sng" dirty="0">
                 <a:solidFill>
                   <a:srgbClr val="002060"/>
@@ -5900,10 +6280,17 @@
   <p:clrMapOvr>
     <a:masterClrMapping/>
   </p:clrMapOvr>
+  <p:timing>
+    <p:tnLst>
+      <p:par>
+        <p:cTn id="1" dur="indefinite" restart="never" nodeType="tmRoot"/>
+      </p:par>
+    </p:tnLst>
+  </p:timing>
 </p:sld>
 </file>
 
-<file path=ppt/slides/slide6.xml><?xml version="1.0" encoding="utf-8"?>
+<file path=ppt/slides/slide7.xml><?xml version="1.0" encoding="utf-8"?>
 <p:sld xmlns:a="http://schemas.openxmlformats.org/drawingml/2006/main" xmlns:r="http://schemas.openxmlformats.org/officeDocument/2006/relationships" xmlns:p="http://schemas.openxmlformats.org/presentationml/2006/main">
   <p:cSld>
     <p:spTree>
@@ -6790,7 +7177,7 @@
 </p:sld>
 </file>
 
-<file path=ppt/slides/slide7.xml><?xml version="1.0" encoding="utf-8"?>
+<file path=ppt/slides/slide8.xml><?xml version="1.0" encoding="utf-8"?>
 <p:sld xmlns:a="http://schemas.openxmlformats.org/drawingml/2006/main" xmlns:r="http://schemas.openxmlformats.org/officeDocument/2006/relationships" xmlns:p="http://schemas.openxmlformats.org/presentationml/2006/main">
   <p:cSld>
     <p:spTree>
@@ -7022,6 +7409,13 @@
   <p:clrMapOvr>
     <a:masterClrMapping/>
   </p:clrMapOvr>
+  <p:timing>
+    <p:tnLst>
+      <p:par>
+        <p:cTn id="1" dur="indefinite" restart="never" nodeType="tmRoot"/>
+      </p:par>
+    </p:tnLst>
+  </p:timing>
 </p:sld>
 </file>
 

</xml_diff>